<commit_message>
Seminar Project 시작 지점 변경
</commit_message>
<xml_diff>
--- a/세미나 PPT (주요 디자인패턴을 활용한 구조화 & 모듈화 ).pptx
+++ b/세미나 PPT (주요 디자인패턴을 활용한 구조화 & 모듈화 ).pptx
@@ -221,7 +221,7 @@
           <a:p>
             <a:fld id="{612868B9-811D-49D8-8987-F354792E18B2}" type="datetimeFigureOut">
               <a:rPr lang="ko-KR" altLang="en-US" smtClean="0"/>
-              <a:t>2018-05-20</a:t>
+              <a:t>2018-05-22</a:t>
             </a:fld>
             <a:endParaRPr lang="ko-KR" altLang="en-US"/>
           </a:p>
@@ -4552,7 +4552,7 @@
           <a:p>
             <a:fld id="{444C5BE4-26C8-453C-B1B6-7D6C3AD55051}" type="datetimeFigureOut">
               <a:rPr lang="ko-KR" altLang="en-US" smtClean="0"/>
-              <a:t>2018-05-20</a:t>
+              <a:t>2018-05-22</a:t>
             </a:fld>
             <a:endParaRPr lang="ko-KR" altLang="en-US"/>
           </a:p>
@@ -4815,7 +4815,7 @@
           <a:p>
             <a:fld id="{444C5BE4-26C8-453C-B1B6-7D6C3AD55051}" type="datetimeFigureOut">
               <a:rPr lang="ko-KR" altLang="en-US" smtClean="0"/>
-              <a:t>2018-05-20</a:t>
+              <a:t>2018-05-22</a:t>
             </a:fld>
             <a:endParaRPr lang="ko-KR" altLang="en-US"/>
           </a:p>
@@ -4993,7 +4993,7 @@
           <a:p>
             <a:fld id="{444C5BE4-26C8-453C-B1B6-7D6C3AD55051}" type="datetimeFigureOut">
               <a:rPr lang="ko-KR" altLang="en-US" smtClean="0"/>
-              <a:t>2018-05-20</a:t>
+              <a:t>2018-05-22</a:t>
             </a:fld>
             <a:endParaRPr lang="ko-KR" altLang="en-US"/>
           </a:p>
@@ -5161,7 +5161,7 @@
           <a:p>
             <a:fld id="{444C5BE4-26C8-453C-B1B6-7D6C3AD55051}" type="datetimeFigureOut">
               <a:rPr lang="ko-KR" altLang="en-US" smtClean="0"/>
-              <a:t>2018-05-20</a:t>
+              <a:t>2018-05-22</a:t>
             </a:fld>
             <a:endParaRPr lang="ko-KR" altLang="en-US"/>
           </a:p>
@@ -5862,7 +5862,7 @@
           <a:p>
             <a:fld id="{444C5BE4-26C8-453C-B1B6-7D6C3AD55051}" type="datetimeFigureOut">
               <a:rPr lang="ko-KR" altLang="en-US" smtClean="0"/>
-              <a:t>2018-05-20</a:t>
+              <a:t>2018-05-22</a:t>
             </a:fld>
             <a:endParaRPr lang="ko-KR" altLang="en-US"/>
           </a:p>
@@ -5979,7 +5979,7 @@
           <a:p>
             <a:fld id="{444C5BE4-26C8-453C-B1B6-7D6C3AD55051}" type="datetimeFigureOut">
               <a:rPr lang="ko-KR" altLang="en-US" smtClean="0"/>
-              <a:t>2018-05-20</a:t>
+              <a:t>2018-05-22</a:t>
             </a:fld>
             <a:endParaRPr lang="ko-KR" altLang="en-US"/>
           </a:p>
@@ -6074,7 +6074,7 @@
           <a:p>
             <a:fld id="{444C5BE4-26C8-453C-B1B6-7D6C3AD55051}" type="datetimeFigureOut">
               <a:rPr lang="ko-KR" altLang="en-US" smtClean="0"/>
-              <a:t>2018-05-20</a:t>
+              <a:t>2018-05-22</a:t>
             </a:fld>
             <a:endParaRPr lang="ko-KR" altLang="en-US"/>
           </a:p>
@@ -6349,7 +6349,7 @@
           <a:p>
             <a:fld id="{444C5BE4-26C8-453C-B1B6-7D6C3AD55051}" type="datetimeFigureOut">
               <a:rPr lang="ko-KR" altLang="en-US" smtClean="0"/>
-              <a:t>2018-05-20</a:t>
+              <a:t>2018-05-22</a:t>
             </a:fld>
             <a:endParaRPr lang="ko-KR" altLang="en-US"/>
           </a:p>
@@ -6601,7 +6601,7 @@
           <a:p>
             <a:fld id="{444C5BE4-26C8-453C-B1B6-7D6C3AD55051}" type="datetimeFigureOut">
               <a:rPr lang="ko-KR" altLang="en-US" smtClean="0"/>
-              <a:t>2018-05-20</a:t>
+              <a:t>2018-05-22</a:t>
             </a:fld>
             <a:endParaRPr lang="ko-KR" altLang="en-US"/>
           </a:p>
@@ -6812,7 +6812,7 @@
           <a:p>
             <a:fld id="{444C5BE4-26C8-453C-B1B6-7D6C3AD55051}" type="datetimeFigureOut">
               <a:rPr lang="ko-KR" altLang="en-US" smtClean="0"/>
-              <a:t>2018-05-20</a:t>
+              <a:t>2018-05-22</a:t>
             </a:fld>
             <a:endParaRPr lang="ko-KR" altLang="en-US"/>
           </a:p>
@@ -9211,8 +9211,8 @@
         </p:nvSpPr>
         <p:spPr>
           <a:xfrm>
-            <a:off x="2778154" y="3445507"/>
-            <a:ext cx="6761527" cy="646331"/>
+            <a:off x="2309122" y="3445507"/>
+            <a:ext cx="7573757" cy="707886"/>
           </a:xfrm>
           <a:prstGeom prst="rect">
             <a:avLst/>
@@ -9226,7 +9226,7 @@
           <a:p>
             <a:pPr algn="ctr"/>
             <a:r>
-              <a:rPr lang="ko-KR" altLang="en-US" dirty="0">
+              <a:rPr lang="ko-KR" altLang="en-US" sz="2000" dirty="0">
                 <a:solidFill>
                   <a:schemeClr val="bg1"/>
                 </a:solidFill>
@@ -9236,7 +9236,7 @@
               <a:t>동작은 다르지만</a:t>
             </a:r>
             <a:r>
-              <a:rPr lang="en-US" altLang="ko-KR" dirty="0">
+              <a:rPr lang="en-US" altLang="ko-KR" sz="2000" dirty="0">
                 <a:solidFill>
                   <a:schemeClr val="bg1"/>
                 </a:solidFill>
@@ -9246,7 +9246,7 @@
               <a:t>, </a:t>
             </a:r>
             <a:r>
-              <a:rPr lang="ko-KR" altLang="en-US" dirty="0">
+              <a:rPr lang="ko-KR" altLang="en-US" sz="2000" dirty="0">
                 <a:solidFill>
                   <a:schemeClr val="bg1"/>
                 </a:solidFill>
@@ -9255,7 +9255,7 @@
               </a:rPr>
               <a:t>서로 밀접한 관계를 가지는 여러 클래스에 대해 </a:t>
             </a:r>
-            <a:endParaRPr lang="en-US" altLang="ko-KR" dirty="0">
+            <a:endParaRPr lang="en-US" altLang="ko-KR" sz="2000" dirty="0">
               <a:solidFill>
                 <a:schemeClr val="bg1"/>
               </a:solidFill>
@@ -9266,7 +9266,7 @@
           <a:p>
             <a:pPr algn="ctr"/>
             <a:r>
-              <a:rPr lang="ko-KR" altLang="en-US" dirty="0">
+              <a:rPr lang="ko-KR" altLang="en-US" sz="2000" dirty="0">
                 <a:solidFill>
                   <a:schemeClr val="bg1"/>
                 </a:solidFill>
@@ -9276,7 +9276,7 @@
               <a:t>필요한 시점에 </a:t>
             </a:r>
             <a:r>
-              <a:rPr lang="ko-KR" altLang="en-US" dirty="0">
+              <a:rPr lang="ko-KR" altLang="en-US" sz="2000" dirty="0">
                 <a:solidFill>
                   <a:srgbClr val="FFA09E"/>
                 </a:solidFill>
@@ -9286,7 +9286,7 @@
               <a:t>수행하는 클래스를 골라 사용하고자 할 때 사용</a:t>
             </a:r>
             <a:r>
-              <a:rPr lang="ko-KR" altLang="en-US" dirty="0">
+              <a:rPr lang="ko-KR" altLang="en-US" sz="2000" dirty="0">
                 <a:solidFill>
                   <a:schemeClr val="bg1"/>
                 </a:solidFill>
@@ -9296,7 +9296,7 @@
               <a:t>하는 패턴</a:t>
             </a:r>
             <a:r>
-              <a:rPr lang="en-US" altLang="ko-KR" dirty="0">
+              <a:rPr lang="en-US" altLang="ko-KR" sz="2000" dirty="0">
                 <a:solidFill>
                   <a:schemeClr val="bg1"/>
                 </a:solidFill>
@@ -9305,7 +9305,7 @@
               </a:rPr>
               <a:t>.</a:t>
             </a:r>
-            <a:endParaRPr lang="ko-KR" altLang="en-US" dirty="0">
+            <a:endParaRPr lang="ko-KR" altLang="en-US" sz="2000" dirty="0">
               <a:solidFill>
                 <a:schemeClr val="bg1"/>
               </a:solidFill>
@@ -9612,8 +9612,8 @@
         </p:nvSpPr>
         <p:spPr>
           <a:xfrm>
-            <a:off x="2778154" y="3445507"/>
-            <a:ext cx="7171189" cy="646331"/>
+            <a:off x="2083344" y="3445507"/>
+            <a:ext cx="8025313" cy="707886"/>
           </a:xfrm>
           <a:prstGeom prst="rect">
             <a:avLst/>
@@ -9627,7 +9627,7 @@
           <a:p>
             <a:pPr algn="ctr"/>
             <a:r>
-              <a:rPr lang="en-US" altLang="ko-KR" dirty="0">
+              <a:rPr lang="en-US" altLang="ko-KR" sz="2000" dirty="0">
                 <a:solidFill>
                   <a:schemeClr val="bg1"/>
                 </a:solidFill>
@@ -9637,7 +9637,7 @@
               <a:t>Game</a:t>
             </a:r>
             <a:r>
-              <a:rPr lang="ko-KR" altLang="en-US" dirty="0">
+              <a:rPr lang="ko-KR" altLang="en-US" sz="2000" dirty="0">
                 <a:solidFill>
                   <a:schemeClr val="bg1"/>
                 </a:solidFill>
@@ -9647,7 +9647,7 @@
               <a:t>에서 몬스터를 공격할 때</a:t>
             </a:r>
             <a:r>
-              <a:rPr lang="en-US" altLang="ko-KR" dirty="0">
+              <a:rPr lang="en-US" altLang="ko-KR" sz="2000" dirty="0">
                 <a:solidFill>
                   <a:schemeClr val="bg1"/>
                 </a:solidFill>
@@ -9657,7 +9657,7 @@
               <a:t>, Attack() Method</a:t>
             </a:r>
             <a:r>
-              <a:rPr lang="ko-KR" altLang="en-US" dirty="0">
+              <a:rPr lang="ko-KR" altLang="en-US" sz="2000" dirty="0">
                 <a:solidFill>
                   <a:schemeClr val="bg1"/>
                 </a:solidFill>
@@ -9666,7 +9666,7 @@
               </a:rPr>
               <a:t>가 실행되는데 </a:t>
             </a:r>
-            <a:endParaRPr lang="en-US" altLang="ko-KR" dirty="0">
+            <a:endParaRPr lang="en-US" altLang="ko-KR" sz="2000" dirty="0">
               <a:solidFill>
                 <a:schemeClr val="bg1"/>
               </a:solidFill>
@@ -9677,7 +9677,7 @@
           <a:p>
             <a:pPr algn="ctr"/>
             <a:r>
-              <a:rPr lang="ko-KR" altLang="en-US" dirty="0">
+              <a:rPr lang="ko-KR" altLang="en-US" sz="2000" dirty="0">
                 <a:solidFill>
                   <a:schemeClr val="bg1"/>
                 </a:solidFill>
@@ -9687,7 +9687,7 @@
               <a:t>현재 </a:t>
             </a:r>
             <a:r>
-              <a:rPr lang="en-US" altLang="ko-KR" dirty="0">
+              <a:rPr lang="en-US" altLang="ko-KR" sz="2000" dirty="0">
                 <a:solidFill>
                   <a:schemeClr val="bg1"/>
                 </a:solidFill>
@@ -9697,7 +9697,7 @@
               <a:t>User</a:t>
             </a:r>
             <a:r>
-              <a:rPr lang="ko-KR" altLang="en-US" dirty="0">
+              <a:rPr lang="ko-KR" altLang="en-US" sz="2000" dirty="0">
                 <a:solidFill>
                   <a:schemeClr val="bg1"/>
                 </a:solidFill>
@@ -9707,7 +9707,7 @@
               <a:t>의 </a:t>
             </a:r>
             <a:r>
-              <a:rPr lang="ko-KR" altLang="en-US" dirty="0">
+              <a:rPr lang="ko-KR" altLang="en-US" sz="2000" dirty="0">
                 <a:solidFill>
                   <a:srgbClr val="FFA09E"/>
                 </a:solidFill>
@@ -9717,7 +9717,7 @@
               <a:t>무기에 따라 다양한 동작이 실행</a:t>
             </a:r>
             <a:r>
-              <a:rPr lang="ko-KR" altLang="en-US" dirty="0">
+              <a:rPr lang="ko-KR" altLang="en-US" sz="2000" dirty="0">
                 <a:solidFill>
                   <a:schemeClr val="bg1"/>
                 </a:solidFill>
@@ -9727,7 +9727,7 @@
               <a:t>되는 경우 </a:t>
             </a:r>
             <a:r>
-              <a:rPr lang="en-US" altLang="ko-KR" dirty="0">
+              <a:rPr lang="en-US" altLang="ko-KR" sz="2000" dirty="0">
                 <a:solidFill>
                   <a:schemeClr val="bg1"/>
                 </a:solidFill>
@@ -9737,7 +9737,7 @@
               <a:t>(</a:t>
             </a:r>
             <a:r>
-              <a:rPr lang="ko-KR" altLang="en-US" dirty="0">
+              <a:rPr lang="ko-KR" altLang="en-US" sz="2000" dirty="0">
                 <a:solidFill>
                   <a:schemeClr val="bg1"/>
                 </a:solidFill>
@@ -9747,7 +9747,7 @@
               <a:t>주먹</a:t>
             </a:r>
             <a:r>
-              <a:rPr lang="en-US" altLang="ko-KR" dirty="0">
+              <a:rPr lang="en-US" altLang="ko-KR" sz="2000" dirty="0">
                 <a:solidFill>
                   <a:schemeClr val="bg1"/>
                 </a:solidFill>
@@ -9757,7 +9757,7 @@
               <a:t>, </a:t>
             </a:r>
             <a:r>
-              <a:rPr lang="ko-KR" altLang="en-US" dirty="0">
+              <a:rPr lang="ko-KR" altLang="en-US" sz="2000" dirty="0">
                 <a:solidFill>
                   <a:schemeClr val="bg1"/>
                 </a:solidFill>
@@ -9767,7 +9767,7 @@
               <a:t>칼</a:t>
             </a:r>
             <a:r>
-              <a:rPr lang="en-US" altLang="ko-KR" dirty="0">
+              <a:rPr lang="en-US" altLang="ko-KR" sz="2000" dirty="0">
                 <a:solidFill>
                   <a:schemeClr val="bg1"/>
                 </a:solidFill>
@@ -9777,7 +9777,7 @@
               <a:t>, </a:t>
             </a:r>
             <a:r>
-              <a:rPr lang="ko-KR" altLang="en-US" dirty="0">
+              <a:rPr lang="ko-KR" altLang="en-US" sz="2000" dirty="0">
                 <a:solidFill>
                   <a:schemeClr val="bg1"/>
                 </a:solidFill>
@@ -9787,7 +9787,7 @@
               <a:t>활</a:t>
             </a:r>
             <a:r>
-              <a:rPr lang="en-US" altLang="ko-KR" dirty="0">
+              <a:rPr lang="en-US" altLang="ko-KR" sz="2000" dirty="0">
                 <a:solidFill>
                   <a:schemeClr val="bg1"/>
                 </a:solidFill>
@@ -9797,7 +9797,7 @@
               <a:t>, </a:t>
             </a:r>
             <a:r>
-              <a:rPr lang="ko-KR" altLang="en-US" dirty="0">
+              <a:rPr lang="ko-KR" altLang="en-US" sz="2000" dirty="0">
                 <a:solidFill>
                   <a:schemeClr val="bg1"/>
                 </a:solidFill>
@@ -9807,7 +9807,7 @@
               <a:t>총 </a:t>
             </a:r>
             <a:r>
-              <a:rPr lang="en-US" altLang="ko-KR" dirty="0">
+              <a:rPr lang="en-US" altLang="ko-KR" sz="2000" dirty="0">
                 <a:solidFill>
                   <a:schemeClr val="bg1"/>
                 </a:solidFill>
@@ -9816,7 +9816,7 @@
               </a:rPr>
               <a:t>....)</a:t>
             </a:r>
-            <a:endParaRPr lang="ko-KR" altLang="en-US" dirty="0">
+            <a:endParaRPr lang="ko-KR" altLang="en-US" sz="2000" dirty="0">
               <a:solidFill>
                 <a:schemeClr val="bg1"/>
               </a:solidFill>
@@ -10964,10 +10964,10 @@
         </p:nvGrpSpPr>
         <p:grpSpPr>
           <a:xfrm>
-            <a:off x="2413932" y="2522718"/>
-            <a:ext cx="7364136" cy="1653010"/>
-            <a:chOff x="2413932" y="2522718"/>
-            <a:chExt cx="7364136" cy="1653010"/>
+            <a:off x="2115722" y="2522718"/>
+            <a:ext cx="7960557" cy="1714565"/>
+            <a:chOff x="2115722" y="2522718"/>
+            <a:chExt cx="7960557" cy="1714565"/>
           </a:xfrm>
         </p:grpSpPr>
         <p:sp>
@@ -10984,8 +10984,8 @@
           </p:nvSpPr>
           <p:spPr>
             <a:xfrm>
-              <a:off x="2413932" y="3529397"/>
-              <a:ext cx="7364136" cy="646331"/>
+              <a:off x="2115722" y="3529397"/>
+              <a:ext cx="7960557" cy="707886"/>
             </a:xfrm>
             <a:prstGeom prst="rect">
               <a:avLst/>
@@ -11015,7 +11015,7 @@
                 <a:defRPr/>
               </a:pPr>
               <a:r>
-                <a:rPr kumimoji="0" lang="ko-KR" altLang="en-US" sz="1800" b="0" i="0" u="none" strike="noStrike" kern="1200" cap="none" spc="0" normalizeH="0" baseline="0" noProof="0" dirty="0">
+                <a:rPr kumimoji="0" lang="ko-KR" altLang="en-US" sz="2000" b="0" i="0" u="none" strike="noStrike" kern="1200" cap="none" spc="0" normalizeH="0" baseline="0" noProof="0" dirty="0">
                   <a:ln>
                     <a:noFill/>
                   </a:ln>
@@ -11032,7 +11032,7 @@
                 <a:t>동작은 다르지만</a:t>
               </a:r>
               <a:r>
-                <a:rPr kumimoji="0" lang="en-US" altLang="ko-KR" sz="1800" b="0" i="0" u="none" strike="noStrike" kern="1200" cap="none" spc="0" normalizeH="0" baseline="0" noProof="0" dirty="0">
+                <a:rPr kumimoji="0" lang="en-US" altLang="ko-KR" sz="2000" b="0" i="0" u="none" strike="noStrike" kern="1200" cap="none" spc="0" normalizeH="0" baseline="0" noProof="0" dirty="0">
                   <a:ln>
                     <a:noFill/>
                   </a:ln>
@@ -11049,7 +11049,7 @@
                 <a:t>, </a:t>
               </a:r>
               <a:r>
-                <a:rPr kumimoji="0" lang="ko-KR" altLang="en-US" sz="1800" b="0" i="0" u="none" strike="noStrike" kern="1200" cap="none" spc="0" normalizeH="0" baseline="0" noProof="0" dirty="0">
+                <a:rPr kumimoji="0" lang="ko-KR" altLang="en-US" sz="2000" b="0" i="0" u="none" strike="noStrike" kern="1200" cap="none" spc="0" normalizeH="0" baseline="0" noProof="0" dirty="0">
                   <a:ln>
                     <a:noFill/>
                   </a:ln>
@@ -11066,7 +11066,7 @@
                 <a:t>서로 밀접한 관계를 가지는 부분을 </a:t>
               </a:r>
               <a:r>
-                <a:rPr kumimoji="0" lang="en-US" altLang="ko-KR" sz="1800" b="0" i="0" u="none" strike="noStrike" kern="1200" cap="none" spc="0" normalizeH="0" baseline="0" noProof="0" dirty="0">
+                <a:rPr kumimoji="0" lang="en-US" altLang="ko-KR" sz="2000" b="0" i="0" u="none" strike="noStrike" kern="1200" cap="none" spc="0" normalizeH="0" baseline="0" noProof="0" dirty="0">
                   <a:ln>
                     <a:noFill/>
                   </a:ln>
@@ -11083,7 +11083,7 @@
                 <a:t>Method</a:t>
               </a:r>
               <a:r>
-                <a:rPr kumimoji="0" lang="ko-KR" altLang="en-US" sz="1800" b="0" i="0" u="none" strike="noStrike" kern="1200" cap="none" spc="0" normalizeH="0" baseline="0" noProof="0" dirty="0">
+                <a:rPr kumimoji="0" lang="ko-KR" altLang="en-US" sz="2000" b="0" i="0" u="none" strike="noStrike" kern="1200" cap="none" spc="0" normalizeH="0" baseline="0" noProof="0" dirty="0">
                   <a:ln>
                     <a:noFill/>
                   </a:ln>
@@ -11099,7 +11099,7 @@
                 </a:rPr>
                 <a:t>가 아닌 </a:t>
               </a:r>
-              <a:endParaRPr kumimoji="0" lang="en-US" altLang="ko-KR" sz="1800" b="0" i="0" u="none" strike="noStrike" kern="1200" cap="none" spc="0" normalizeH="0" baseline="0" noProof="0" dirty="0">
+              <a:endParaRPr kumimoji="0" lang="en-US" altLang="ko-KR" sz="2000" b="0" i="0" u="none" strike="noStrike" kern="1200" cap="none" spc="0" normalizeH="0" baseline="0" noProof="0" dirty="0">
                 <a:ln>
                   <a:noFill/>
                 </a:ln>
@@ -11133,7 +11133,7 @@
                 <a:defRPr/>
               </a:pPr>
               <a:r>
-                <a:rPr kumimoji="0" lang="en-US" altLang="ko-KR" sz="1800" b="0" i="0" u="none" strike="noStrike" kern="1200" cap="none" spc="0" normalizeH="0" baseline="0" noProof="0" dirty="0">
+                <a:rPr kumimoji="0" lang="en-US" altLang="ko-KR" sz="2000" b="0" i="0" u="none" strike="noStrike" kern="1200" cap="none" spc="0" normalizeH="0" baseline="0" noProof="0" dirty="0">
                   <a:ln>
                     <a:noFill/>
                   </a:ln>
@@ -11150,7 +11150,7 @@
                 <a:t>Class</a:t>
               </a:r>
               <a:r>
-                <a:rPr kumimoji="0" lang="ko-KR" altLang="en-US" sz="1800" b="0" i="0" u="none" strike="noStrike" kern="1200" cap="none" spc="0" normalizeH="0" baseline="0" noProof="0" dirty="0">
+                <a:rPr kumimoji="0" lang="ko-KR" altLang="en-US" sz="2000" b="0" i="0" u="none" strike="noStrike" kern="1200" cap="none" spc="0" normalizeH="0" baseline="0" noProof="0" dirty="0">
                   <a:ln>
                     <a:noFill/>
                   </a:ln>
@@ -11167,7 +11167,7 @@
                 <a:t>으로 만들어 </a:t>
               </a:r>
               <a:r>
-                <a:rPr kumimoji="0" lang="en-US" altLang="ko-KR" sz="1800" b="0" i="0" u="none" strike="noStrike" kern="1200" cap="none" spc="0" normalizeH="0" baseline="0" noProof="0" dirty="0">
+                <a:rPr kumimoji="0" lang="en-US" altLang="ko-KR" sz="2000" b="0" i="0" u="none" strike="noStrike" kern="1200" cap="none" spc="0" normalizeH="0" baseline="0" noProof="0" dirty="0">
                   <a:ln>
                     <a:noFill/>
                   </a:ln>
@@ -11184,7 +11184,7 @@
                 <a:t>Interface</a:t>
               </a:r>
               <a:r>
-                <a:rPr kumimoji="0" lang="ko-KR" altLang="en-US" sz="1800" b="0" i="0" u="none" strike="noStrike" kern="1200" cap="none" spc="0" normalizeH="0" baseline="0" noProof="0" dirty="0">
+                <a:rPr kumimoji="0" lang="ko-KR" altLang="en-US" sz="2000" b="0" i="0" u="none" strike="noStrike" kern="1200" cap="none" spc="0" normalizeH="0" baseline="0" noProof="0" dirty="0">
                   <a:ln>
                     <a:noFill/>
                   </a:ln>
@@ -11201,7 +11201,7 @@
                 <a:t>의 인스턴스를 교체하는 식으로 구현</a:t>
               </a:r>
               <a:r>
-                <a:rPr kumimoji="0" lang="ko-KR" altLang="en-US" sz="1800" b="0" i="0" u="none" strike="noStrike" kern="1200" cap="none" spc="0" normalizeH="0" baseline="0" noProof="0" dirty="0">
+                <a:rPr kumimoji="0" lang="ko-KR" altLang="en-US" sz="2000" b="0" i="0" u="none" strike="noStrike" kern="1200" cap="none" spc="0" normalizeH="0" baseline="0" noProof="0" dirty="0">
                   <a:ln>
                     <a:noFill/>
                   </a:ln>
@@ -11218,7 +11218,7 @@
                 <a:t>하는 패턴</a:t>
               </a:r>
               <a:r>
-                <a:rPr kumimoji="0" lang="en-US" altLang="ko-KR" sz="1800" b="0" i="0" u="none" strike="noStrike" kern="1200" cap="none" spc="0" normalizeH="0" baseline="0" noProof="0" dirty="0">
+                <a:rPr kumimoji="0" lang="en-US" altLang="ko-KR" sz="2000" b="0" i="0" u="none" strike="noStrike" kern="1200" cap="none" spc="0" normalizeH="0" baseline="0" noProof="0" dirty="0">
                   <a:ln>
                     <a:noFill/>
                   </a:ln>
@@ -11234,7 +11234,7 @@
                 </a:rPr>
                 <a:t>.</a:t>
               </a:r>
-              <a:endParaRPr kumimoji="0" lang="ko-KR" altLang="en-US" sz="1800" b="0" i="0" u="none" strike="noStrike" kern="1200" cap="none" spc="0" normalizeH="0" baseline="0" noProof="0" dirty="0">
+              <a:endParaRPr kumimoji="0" lang="ko-KR" altLang="en-US" sz="2000" b="0" i="0" u="none" strike="noStrike" kern="1200" cap="none" spc="0" normalizeH="0" baseline="0" noProof="0" dirty="0">
                 <a:ln>
                   <a:noFill/>
                 </a:ln>
@@ -12249,8 +12249,8 @@
         </p:nvSpPr>
         <p:spPr>
           <a:xfrm>
-            <a:off x="2778154" y="3445507"/>
-            <a:ext cx="7003799" cy="646331"/>
+            <a:off x="2184943" y="3383952"/>
+            <a:ext cx="7822114" cy="707886"/>
           </a:xfrm>
           <a:prstGeom prst="rect">
             <a:avLst/>
@@ -12264,7 +12264,7 @@
           <a:p>
             <a:pPr algn="ctr"/>
             <a:r>
-              <a:rPr lang="ko-KR" altLang="en-US" dirty="0">
+              <a:rPr lang="ko-KR" altLang="en-US" sz="2000" dirty="0">
                 <a:solidFill>
                   <a:srgbClr val="FFA09E"/>
                 </a:solidFill>
@@ -12274,7 +12274,7 @@
               <a:t>한 객체의 상태가 바뀌면 그 객체에 의존하는 다른 객체들에게 연락</a:t>
             </a:r>
             <a:r>
-              <a:rPr lang="ko-KR" altLang="en-US" dirty="0">
+              <a:rPr lang="ko-KR" altLang="en-US" sz="2000" dirty="0">
                 <a:solidFill>
                   <a:schemeClr val="bg1"/>
                 </a:solidFill>
@@ -12284,7 +12284,7 @@
               <a:t>이 가고 자동으로 내용이 갱신되는 방식으로 일대다</a:t>
             </a:r>
             <a:r>
-              <a:rPr lang="en-US" altLang="ko-KR" dirty="0">
+              <a:rPr lang="en-US" altLang="ko-KR" sz="2000" dirty="0">
                 <a:solidFill>
                   <a:schemeClr val="bg1"/>
                 </a:solidFill>
@@ -12294,7 +12294,7 @@
               <a:t>(1:N) </a:t>
             </a:r>
             <a:r>
-              <a:rPr lang="ko-KR" altLang="en-US" dirty="0">
+              <a:rPr lang="ko-KR" altLang="en-US" sz="2000" dirty="0">
                 <a:solidFill>
                   <a:schemeClr val="bg1"/>
                 </a:solidFill>
@@ -12428,7 +12428,7 @@
         <p:spPr>
           <a:xfrm>
             <a:off x="2778154" y="4091838"/>
-            <a:ext cx="7003799" cy="369332"/>
+            <a:ext cx="7003799" cy="400110"/>
           </a:xfrm>
           <a:prstGeom prst="rect">
             <a:avLst/>
@@ -12442,7 +12442,7 @@
           <a:p>
             <a:pPr algn="ctr"/>
             <a:r>
-              <a:rPr lang="en-US" altLang="ko-KR" dirty="0">
+              <a:rPr lang="en-US" altLang="ko-KR" sz="2000" dirty="0">
                 <a:solidFill>
                   <a:schemeClr val="bg1"/>
                 </a:solidFill>
@@ -12452,7 +12452,7 @@
               <a:t>- </a:t>
             </a:r>
             <a:r>
-              <a:rPr lang="ko-KR" altLang="en-US" dirty="0">
+              <a:rPr lang="ko-KR" altLang="en-US" sz="2000" dirty="0">
                 <a:solidFill>
                   <a:schemeClr val="bg1"/>
                 </a:solidFill>
@@ -12462,7 +12462,7 @@
               <a:t>보통의 </a:t>
             </a:r>
             <a:r>
-              <a:rPr lang="en-US" altLang="ko-KR" dirty="0">
+              <a:rPr lang="en-US" altLang="ko-KR" sz="2000" dirty="0">
                 <a:solidFill>
                   <a:schemeClr val="bg1"/>
                 </a:solidFill>
@@ -12472,7 +12472,7 @@
               <a:t>Click Listener</a:t>
             </a:r>
             <a:r>
-              <a:rPr lang="ko-KR" altLang="en-US" dirty="0">
+              <a:rPr lang="ko-KR" altLang="en-US" sz="2000" dirty="0">
                 <a:solidFill>
                   <a:schemeClr val="bg1"/>
                 </a:solidFill>
@@ -12482,7 +12482,7 @@
               <a:t>는 </a:t>
             </a:r>
             <a:r>
-              <a:rPr lang="en-US" altLang="ko-KR" dirty="0">
+              <a:rPr lang="en-US" altLang="ko-KR" sz="2000" dirty="0">
                 <a:solidFill>
                   <a:schemeClr val="bg1"/>
                 </a:solidFill>
@@ -12492,7 +12492,7 @@
               <a:t>1:1 </a:t>
             </a:r>
             <a:r>
-              <a:rPr lang="ko-KR" altLang="en-US" dirty="0">
+              <a:rPr lang="ko-KR" altLang="en-US" sz="2000" dirty="0">
                 <a:solidFill>
                   <a:schemeClr val="bg1"/>
                 </a:solidFill>
@@ -12502,7 +12502,7 @@
               <a:t>의존성의 </a:t>
             </a:r>
             <a:r>
-              <a:rPr lang="ko-KR" altLang="en-US" dirty="0" err="1">
+              <a:rPr lang="ko-KR" altLang="en-US" sz="2000" dirty="0" err="1">
                 <a:solidFill>
                   <a:schemeClr val="bg1"/>
                 </a:solidFill>
@@ -12512,7 +12512,7 @@
               <a:t>옵저버</a:t>
             </a:r>
             <a:r>
-              <a:rPr lang="ko-KR" altLang="en-US" dirty="0">
+              <a:rPr lang="ko-KR" altLang="en-US" sz="2000" dirty="0">
                 <a:solidFill>
                   <a:schemeClr val="bg1"/>
                 </a:solidFill>
@@ -12522,7 +12522,7 @@
               <a:t> 패턴 </a:t>
             </a:r>
             <a:r>
-              <a:rPr lang="en-US" altLang="ko-KR" dirty="0">
+              <a:rPr lang="en-US" altLang="ko-KR" sz="2000" dirty="0">
                 <a:solidFill>
                   <a:schemeClr val="bg1"/>
                 </a:solidFill>
@@ -12531,7 +12531,7 @@
               </a:rPr>
               <a:t>-</a:t>
             </a:r>
-            <a:endParaRPr lang="ko-KR" altLang="en-US" dirty="0">
+            <a:endParaRPr lang="ko-KR" altLang="en-US" sz="2000" dirty="0">
               <a:solidFill>
                 <a:schemeClr val="bg1"/>
               </a:solidFill>
@@ -13130,8 +13130,8 @@
         </p:nvSpPr>
         <p:spPr bwMode="auto">
           <a:xfrm>
-            <a:off x="1290037" y="3345344"/>
-            <a:ext cx="9611926" cy="1477328"/>
+            <a:off x="751428" y="3268400"/>
+            <a:ext cx="10689145" cy="1631216"/>
           </a:xfrm>
           <a:prstGeom prst="rect">
             <a:avLst/>
@@ -13196,7 +13196,7 @@
               <a:tabLst/>
             </a:pPr>
             <a:r>
-              <a:rPr kumimoji="0" lang="ko-KR" altLang="ko-KR" sz="1800" b="0" i="0" u="none" strike="noStrike" cap="none" normalizeH="0" baseline="0" dirty="0">
+              <a:rPr kumimoji="0" lang="ko-KR" altLang="ko-KR" sz="2000" b="0" i="0" u="none" strike="noStrike" cap="none" normalizeH="0" baseline="0" dirty="0">
                 <a:ln>
                   <a:noFill/>
                 </a:ln>
@@ -13210,7 +13210,7 @@
               <a:t>객체 지향 설계를 </a:t>
             </a:r>
             <a:r>
-              <a:rPr kumimoji="0" lang="ko-KR" altLang="ko-KR" sz="1800" b="0" i="0" u="none" strike="noStrike" cap="none" normalizeH="0" baseline="0" dirty="0" err="1">
+              <a:rPr kumimoji="0" lang="ko-KR" altLang="ko-KR" sz="2000" b="0" i="0" u="none" strike="noStrike" cap="none" normalizeH="0" baseline="0" dirty="0" err="1">
                 <a:ln>
                   <a:noFill/>
                 </a:ln>
@@ -13224,7 +13224,7 @@
               <a:t>하다보면</a:t>
             </a:r>
             <a:r>
-              <a:rPr kumimoji="0" lang="ko-KR" altLang="ko-KR" sz="1800" b="0" i="0" u="none" strike="noStrike" cap="none" normalizeH="0" baseline="0" dirty="0">
+              <a:rPr kumimoji="0" lang="ko-KR" altLang="ko-KR" sz="2000" b="0" i="0" u="none" strike="noStrike" cap="none" normalizeH="0" baseline="0" dirty="0">
                 <a:ln>
                   <a:noFill/>
                 </a:ln>
@@ -13237,7 +13237,7 @@
               </a:rPr>
               <a:t> 객체들 사이에서 다양한 처리를 할 경우가 많은데, </a:t>
             </a:r>
-            <a:endParaRPr kumimoji="0" lang="en-US" altLang="ko-KR" sz="1800" b="0" i="0" u="none" strike="noStrike" cap="none" normalizeH="0" baseline="0" dirty="0">
+            <a:endParaRPr kumimoji="0" lang="en-US" altLang="ko-KR" sz="2000" b="0" i="0" u="none" strike="noStrike" cap="none" normalizeH="0" baseline="0" dirty="0">
               <a:ln>
                 <a:noFill/>
               </a:ln>
@@ -13267,7 +13267,7 @@
               <a:tabLst/>
             </a:pPr>
             <a:r>
-              <a:rPr kumimoji="0" lang="ko-KR" altLang="ko-KR" sz="1800" b="0" i="0" u="none" strike="noStrike" cap="none" normalizeH="0" baseline="0" dirty="0">
+              <a:rPr kumimoji="0" lang="ko-KR" altLang="ko-KR" sz="2000" b="0" i="0" u="none" strike="noStrike" cap="none" normalizeH="0" baseline="0" dirty="0">
                 <a:ln>
                   <a:noFill/>
                 </a:ln>
@@ -13281,7 +13281,7 @@
               <a:t>한 객체의 상태가 바뀔 경우 다른 객체들에게 변경됐다고 알려주는 경우에 </a:t>
             </a:r>
             <a:r>
-              <a:rPr kumimoji="0" lang="ko-KR" altLang="ko-KR" sz="1800" b="0" i="0" u="none" strike="noStrike" cap="none" normalizeH="0" baseline="0" dirty="0">
+              <a:rPr kumimoji="0" lang="ko-KR" altLang="ko-KR" sz="2000" b="0" i="0" u="none" strike="noStrike" cap="none" normalizeH="0" baseline="0" dirty="0">
                 <a:ln>
                   <a:noFill/>
                 </a:ln>
@@ -13295,7 +13295,7 @@
               <a:t>정말 </a:t>
             </a:r>
             <a:r>
-              <a:rPr kumimoji="0" lang="ko-KR" altLang="ko-KR" sz="1800" b="1" i="0" u="none" strike="noStrike" cap="none" normalizeH="0" baseline="0" dirty="0">
+              <a:rPr kumimoji="0" lang="ko-KR" altLang="ko-KR" sz="2000" b="1" i="0" u="none" strike="noStrike" cap="none" normalizeH="0" baseline="0" dirty="0">
                 <a:ln>
                   <a:noFill/>
                 </a:ln>
@@ -13309,7 +13309,7 @@
               <a:t>많이</a:t>
             </a:r>
             <a:r>
-              <a:rPr kumimoji="0" lang="ko-KR" altLang="ko-KR" sz="1800" b="0" i="0" u="none" strike="noStrike" cap="none" normalizeH="0" baseline="0" dirty="0">
+              <a:rPr kumimoji="0" lang="ko-KR" altLang="ko-KR" sz="2000" b="0" i="0" u="none" strike="noStrike" cap="none" normalizeH="0" baseline="0" dirty="0">
                 <a:ln>
                   <a:noFill/>
                 </a:ln>
@@ -13323,7 +13323,7 @@
               <a:t> 쓰이는 패턴</a:t>
             </a:r>
             <a:r>
-              <a:rPr kumimoji="0" lang="ko-KR" altLang="ko-KR" sz="1800" b="0" i="0" u="none" strike="noStrike" cap="none" normalizeH="0" baseline="0" dirty="0">
+              <a:rPr kumimoji="0" lang="ko-KR" altLang="ko-KR" sz="2000" b="0" i="0" u="none" strike="noStrike" cap="none" normalizeH="0" baseline="0" dirty="0">
                 <a:ln>
                   <a:noFill/>
                 </a:ln>
@@ -13336,7 +13336,7 @@
               </a:rPr>
               <a:t>이다.</a:t>
             </a:r>
-            <a:endParaRPr kumimoji="0" lang="ko-KR" altLang="en-US" sz="1800" b="0" i="0" u="none" strike="noStrike" cap="none" normalizeH="0" baseline="0" dirty="0">
+            <a:endParaRPr kumimoji="0" lang="ko-KR" altLang="en-US" sz="2000" b="0" i="0" u="none" strike="noStrike" cap="none" normalizeH="0" baseline="0" dirty="0">
               <a:ln>
                 <a:noFill/>
               </a:ln>
@@ -13365,7 +13365,7 @@
               <a:buNone/>
               <a:tabLst/>
             </a:pPr>
-            <a:endParaRPr kumimoji="0" lang="en-US" altLang="ko-KR" sz="1800" b="0" i="0" u="none" strike="noStrike" cap="none" normalizeH="0" baseline="0" dirty="0">
+            <a:endParaRPr kumimoji="0" lang="en-US" altLang="ko-KR" sz="2000" b="0" i="0" u="none" strike="noStrike" cap="none" normalizeH="0" baseline="0" dirty="0">
               <a:ln>
                 <a:noFill/>
               </a:ln>
@@ -13394,7 +13394,7 @@
               <a:buNone/>
               <a:tabLst/>
             </a:pPr>
-            <a:endParaRPr kumimoji="0" lang="en-US" altLang="ko-KR" sz="1800" b="0" i="0" u="none" strike="noStrike" cap="none" normalizeH="0" baseline="0" dirty="0">
+            <a:endParaRPr kumimoji="0" lang="en-US" altLang="ko-KR" sz="2000" b="0" i="0" u="none" strike="noStrike" cap="none" normalizeH="0" baseline="0" dirty="0">
               <a:ln>
                 <a:noFill/>
               </a:ln>
@@ -13423,7 +13423,7 @@
               <a:buNone/>
               <a:tabLst/>
             </a:pPr>
-            <a:endParaRPr kumimoji="0" lang="ko-KR" altLang="ko-KR" sz="1800" b="0" i="0" u="none" strike="noStrike" cap="none" normalizeH="0" baseline="0" dirty="0">
+            <a:endParaRPr kumimoji="0" lang="ko-KR" altLang="ko-KR" sz="2000" b="0" i="0" u="none" strike="noStrike" cap="none" normalizeH="0" baseline="0" dirty="0">
               <a:ln>
                 <a:noFill/>
               </a:ln>
@@ -13452,7 +13452,7 @@
         <p:spPr>
           <a:xfrm>
             <a:off x="552869" y="4222507"/>
-            <a:ext cx="11086261" cy="646331"/>
+            <a:ext cx="11086261" cy="707886"/>
           </a:xfrm>
           <a:prstGeom prst="rect">
             <a:avLst/>
@@ -13473,7 +13473,7 @@
               </a:spcAft>
             </a:pPr>
             <a:r>
-              <a:rPr lang="ko-KR" altLang="ko-KR" dirty="0">
+              <a:rPr lang="ko-KR" altLang="ko-KR" sz="2000" dirty="0">
                 <a:solidFill>
                   <a:schemeClr val="bg1"/>
                 </a:solidFill>
@@ -13482,7 +13482,7 @@
               </a:rPr>
               <a:t>서로의 정보를 넘기고 받는 과정에서 정보의 단위가 클 수록, 객체들의 규모가 클 수록, </a:t>
             </a:r>
-            <a:endParaRPr lang="en-US" altLang="ko-KR" dirty="0">
+            <a:endParaRPr lang="en-US" altLang="ko-KR" sz="2000" dirty="0">
               <a:solidFill>
                 <a:schemeClr val="bg1"/>
               </a:solidFill>
@@ -13500,7 +13500,7 @@
               </a:spcAft>
             </a:pPr>
             <a:r>
-              <a:rPr lang="ko-KR" altLang="ko-KR" dirty="0">
+              <a:rPr lang="ko-KR" altLang="ko-KR" sz="2000" dirty="0">
                 <a:solidFill>
                   <a:schemeClr val="bg1"/>
                 </a:solidFill>
@@ -13510,7 +13510,7 @@
               <a:t>각 객체들의 관계가 </a:t>
             </a:r>
             <a:r>
-              <a:rPr lang="ko-KR" altLang="ko-KR" dirty="0">
+              <a:rPr lang="ko-KR" altLang="ko-KR" sz="2000" dirty="0">
                 <a:solidFill>
                   <a:srgbClr val="FFA09E"/>
                 </a:solidFill>
@@ -13520,7 +13520,7 @@
               <a:t>복잡</a:t>
             </a:r>
             <a:r>
-              <a:rPr lang="ko-KR" altLang="en-US" dirty="0">
+              <a:rPr lang="ko-KR" altLang="en-US" sz="2000" dirty="0">
                 <a:solidFill>
                   <a:srgbClr val="FFA09E"/>
                 </a:solidFill>
@@ -13530,7 +13530,7 @@
               <a:t>한 상황에서 </a:t>
             </a:r>
             <a:r>
-              <a:rPr lang="ko-KR" altLang="ko-KR" dirty="0">
+              <a:rPr lang="ko-KR" altLang="ko-KR" sz="2000" dirty="0">
                 <a:solidFill>
                   <a:srgbClr val="FFA09E"/>
                 </a:solidFill>
@@ -13540,7 +13540,7 @@
               <a:t>기능을 단순히 처리</a:t>
             </a:r>
             <a:r>
-              <a:rPr lang="ko-KR" altLang="ko-KR" dirty="0">
+              <a:rPr lang="ko-KR" altLang="ko-KR" sz="2000" dirty="0">
                 <a:solidFill>
                   <a:schemeClr val="bg1"/>
                 </a:solidFill>
@@ -13549,7 +13549,7 @@
               </a:rPr>
               <a:t>할 수 있게 만들어줄 수 있다.</a:t>
             </a:r>
-            <a:endParaRPr lang="ko-KR" altLang="en-US" dirty="0"/>
+            <a:endParaRPr lang="ko-KR" altLang="en-US" sz="2000" dirty="0"/>
           </a:p>
         </p:txBody>
       </p:sp>

</xml_diff>